<commit_message>
actualizado DICOTOMIZADOR IERATIVO  ID3
</commit_message>
<xml_diff>
--- a/DICOTOMIZADOR IERATIVO  ID3.pptx
+++ b/DICOTOMIZADOR IERATIVO  ID3.pptx
@@ -6,7 +6,14 @@
   </p:sldMasterIdLst>
   <p:sldIdLst>
     <p:sldId id="259" r:id="rId2"/>
-    <p:sldId id="257" r:id="rId3"/>
+    <p:sldId id="260" r:id="rId3"/>
+    <p:sldId id="261" r:id="rId4"/>
+    <p:sldId id="262" r:id="rId5"/>
+    <p:sldId id="263" r:id="rId6"/>
+    <p:sldId id="265" r:id="rId7"/>
+    <p:sldId id="264" r:id="rId8"/>
+    <p:sldId id="266" r:id="rId9"/>
+    <p:sldId id="257" r:id="rId10"/>
   </p:sldIdLst>
   <p:sldSz cx="9906000" cy="6858000" type="A4"/>
   <p:notesSz cx="6858000" cy="9144000"/>
@@ -6177,7 +6184,7 @@
         </p:blipFill>
         <p:spPr bwMode="auto">
           <a:xfrm>
-            <a:off x="7298749" y="3040334"/>
+            <a:off x="5738639" y="2110772"/>
             <a:ext cx="2288209" cy="1727598"/>
           </a:xfrm>
           <a:prstGeom prst="rect">
@@ -6224,8 +6231,8 @@
         </p:blipFill>
         <p:spPr bwMode="auto">
           <a:xfrm rot="1131174">
-            <a:off x="570536" y="380052"/>
-            <a:ext cx="1078765" cy="1735667"/>
+            <a:off x="2391279" y="2156930"/>
+            <a:ext cx="972562" cy="1564792"/>
           </a:xfrm>
           <a:prstGeom prst="rect">
             <a:avLst/>
@@ -6271,7 +6278,7 @@
         </p:blipFill>
         <p:spPr bwMode="auto">
           <a:xfrm>
-            <a:off x="3799090" y="5178256"/>
+            <a:off x="3936008" y="4335720"/>
             <a:ext cx="1416925" cy="1464732"/>
           </a:xfrm>
           <a:prstGeom prst="rect">
@@ -6318,7 +6325,7 @@
         </p:blipFill>
         <p:spPr bwMode="auto">
           <a:xfrm>
-            <a:off x="196403" y="4411782"/>
+            <a:off x="689235" y="3824794"/>
             <a:ext cx="1300957" cy="1543993"/>
           </a:xfrm>
           <a:prstGeom prst="rect">
@@ -6365,7 +6372,7 @@
         </p:blipFill>
         <p:spPr bwMode="auto">
           <a:xfrm>
-            <a:off x="7738533" y="1247885"/>
+            <a:off x="7713743" y="3508721"/>
             <a:ext cx="2021457" cy="1459045"/>
           </a:xfrm>
           <a:prstGeom prst="rect">
@@ -6412,7 +6419,7 @@
         </p:blipFill>
         <p:spPr bwMode="auto">
           <a:xfrm>
-            <a:off x="5663224" y="4919918"/>
+            <a:off x="5445307" y="4355298"/>
             <a:ext cx="1761068" cy="1761068"/>
           </a:xfrm>
           <a:prstGeom prst="rect">
@@ -6506,7 +6513,7 @@
         </p:blipFill>
         <p:spPr bwMode="auto">
           <a:xfrm>
-            <a:off x="1334118" y="4596791"/>
+            <a:off x="1504970" y="4242720"/>
             <a:ext cx="2252133" cy="2252133"/>
           </a:xfrm>
           <a:prstGeom prst="rect">
@@ -6546,7 +6553,7 @@
         </p:blipFill>
         <p:spPr>
           <a:xfrm>
-            <a:off x="955777" y="3330398"/>
+            <a:off x="3590576" y="2565161"/>
             <a:ext cx="2148063" cy="1456733"/>
           </a:xfrm>
           <a:prstGeom prst="rect">
@@ -6583,7 +6590,7 @@
         </p:blipFill>
         <p:spPr bwMode="auto">
           <a:xfrm>
-            <a:off x="8040520" y="4937604"/>
+            <a:off x="7344329" y="5068086"/>
             <a:ext cx="1546438" cy="1761068"/>
           </a:xfrm>
           <a:prstGeom prst="rect">
@@ -6630,7 +6637,7 @@
         </p:blipFill>
         <p:spPr bwMode="auto">
           <a:xfrm>
-            <a:off x="7009409" y="332176"/>
+            <a:off x="7756322" y="2400609"/>
             <a:ext cx="1680638" cy="1077434"/>
           </a:xfrm>
           <a:prstGeom prst="rect">
@@ -6662,7 +6669,7 @@
         </p:nvSpPr>
         <p:spPr>
           <a:xfrm>
-            <a:off x="3256223" y="332176"/>
+            <a:off x="3580927" y="635528"/>
             <a:ext cx="2414693" cy="646331"/>
           </a:xfrm>
           <a:prstGeom prst="rect">
@@ -6687,282 +6694,6 @@
             <a:r>
               <a:rPr lang="es-MX" dirty="0"/>
               <a:t>Si es un objeto</a:t>
-            </a:r>
-            <a:endParaRPr lang="es-PE" dirty="0"/>
-          </a:p>
-        </p:txBody>
-      </p:sp>
-      <p:sp>
-        <p:nvSpPr>
-          <p:cNvPr id="15" name="CuadroTexto 14">
-            <a:extLst>
-              <a:ext uri="{FF2B5EF4-FFF2-40B4-BE49-F238E27FC236}">
-                <a16:creationId xmlns:a16="http://schemas.microsoft.com/office/drawing/2014/main" id="{9435F447-E7F3-4557-A1C4-A8DA3BC7B1E9}"/>
-              </a:ext>
-            </a:extLst>
-          </p:cNvPr>
-          <p:cNvSpPr txBox="1"/>
-          <p:nvPr/>
-        </p:nvSpPr>
-        <p:spPr>
-          <a:xfrm>
-            <a:off x="3400157" y="1057548"/>
-            <a:ext cx="2414693" cy="646331"/>
-          </a:xfrm>
-          <a:prstGeom prst="rect">
-            <a:avLst/>
-          </a:prstGeom>
-          <a:noFill/>
-        </p:spPr>
-        <p:txBody>
-          <a:bodyPr wrap="square" rtlCol="0">
-            <a:spAutoFit/>
-          </a:bodyPr>
-          <a:lstStyle/>
-          <a:p>
-            <a:pPr algn="ctr"/>
-            <a:r>
-              <a:rPr lang="es-MX" dirty="0"/>
-              <a:t>¿ es suave o </a:t>
-            </a:r>
-            <a:r>
-              <a:rPr lang="es-MX" dirty="0" err="1"/>
-              <a:t>aspero</a:t>
-            </a:r>
-            <a:r>
-              <a:rPr lang="es-MX" dirty="0"/>
-              <a:t>?</a:t>
-            </a:r>
-          </a:p>
-          <a:p>
-            <a:pPr algn="ctr"/>
-            <a:r>
-              <a:rPr lang="es-MX" dirty="0"/>
-              <a:t>Es </a:t>
-            </a:r>
-            <a:r>
-              <a:rPr lang="es-MX" dirty="0" err="1"/>
-              <a:t>aspero</a:t>
-            </a:r>
-            <a:endParaRPr lang="es-PE" dirty="0"/>
-          </a:p>
-        </p:txBody>
-      </p:sp>
-      <p:sp>
-        <p:nvSpPr>
-          <p:cNvPr id="16" name="CuadroTexto 15">
-            <a:extLst>
-              <a:ext uri="{FF2B5EF4-FFF2-40B4-BE49-F238E27FC236}">
-                <a16:creationId xmlns:a16="http://schemas.microsoft.com/office/drawing/2014/main" id="{DE771697-5F17-428E-A11B-40330E03A600}"/>
-              </a:ext>
-            </a:extLst>
-          </p:cNvPr>
-          <p:cNvSpPr txBox="1"/>
-          <p:nvPr/>
-        </p:nvSpPr>
-        <p:spPr>
-          <a:xfrm>
-            <a:off x="3270483" y="1711376"/>
-            <a:ext cx="2674039" cy="646331"/>
-          </a:xfrm>
-          <a:prstGeom prst="rect">
-            <a:avLst/>
-          </a:prstGeom>
-          <a:noFill/>
-        </p:spPr>
-        <p:txBody>
-          <a:bodyPr wrap="square" rtlCol="0">
-            <a:spAutoFit/>
-          </a:bodyPr>
-          <a:lstStyle/>
-          <a:p>
-            <a:pPr algn="ctr"/>
-            <a:r>
-              <a:rPr lang="es-MX" dirty="0"/>
-              <a:t>¿ su sonido es melodioso?</a:t>
-            </a:r>
-          </a:p>
-          <a:p>
-            <a:pPr algn="ctr"/>
-            <a:r>
-              <a:rPr lang="es-MX" dirty="0"/>
-              <a:t>si</a:t>
-            </a:r>
-            <a:endParaRPr lang="es-PE" dirty="0"/>
-          </a:p>
-        </p:txBody>
-      </p:sp>
-      <p:sp>
-        <p:nvSpPr>
-          <p:cNvPr id="17" name="CuadroTexto 16">
-            <a:extLst>
-              <a:ext uri="{FF2B5EF4-FFF2-40B4-BE49-F238E27FC236}">
-                <a16:creationId xmlns:a16="http://schemas.microsoft.com/office/drawing/2014/main" id="{4BAC4DF6-3FDA-4BF6-A6D2-2F5155659D82}"/>
-              </a:ext>
-            </a:extLst>
-          </p:cNvPr>
-          <p:cNvSpPr txBox="1"/>
-          <p:nvPr/>
-        </p:nvSpPr>
-        <p:spPr>
-          <a:xfrm>
-            <a:off x="3355700" y="2383764"/>
-            <a:ext cx="2674039" cy="646331"/>
-          </a:xfrm>
-          <a:prstGeom prst="rect">
-            <a:avLst/>
-          </a:prstGeom>
-          <a:noFill/>
-        </p:spPr>
-        <p:txBody>
-          <a:bodyPr wrap="square" rtlCol="0">
-            <a:spAutoFit/>
-          </a:bodyPr>
-          <a:lstStyle/>
-          <a:p>
-            <a:pPr algn="ctr"/>
-            <a:r>
-              <a:rPr lang="es-MX" dirty="0"/>
-              <a:t>¿ es un instrumento musical?</a:t>
-            </a:r>
-          </a:p>
-          <a:p>
-            <a:pPr algn="ctr"/>
-            <a:r>
-              <a:rPr lang="es-MX" dirty="0"/>
-              <a:t>si</a:t>
-            </a:r>
-            <a:endParaRPr lang="es-PE" dirty="0"/>
-          </a:p>
-        </p:txBody>
-      </p:sp>
-      <p:sp>
-        <p:nvSpPr>
-          <p:cNvPr id="19" name="CuadroTexto 18">
-            <a:extLst>
-              <a:ext uri="{FF2B5EF4-FFF2-40B4-BE49-F238E27FC236}">
-                <a16:creationId xmlns:a16="http://schemas.microsoft.com/office/drawing/2014/main" id="{FA3866BB-D8C3-4706-B801-A6CC50B9B51F}"/>
-              </a:ext>
-            </a:extLst>
-          </p:cNvPr>
-          <p:cNvSpPr txBox="1"/>
-          <p:nvPr/>
-        </p:nvSpPr>
-        <p:spPr>
-          <a:xfrm>
-            <a:off x="3400157" y="2923115"/>
-            <a:ext cx="2674039" cy="646331"/>
-          </a:xfrm>
-          <a:prstGeom prst="rect">
-            <a:avLst/>
-          </a:prstGeom>
-          <a:noFill/>
-        </p:spPr>
-        <p:txBody>
-          <a:bodyPr wrap="square" rtlCol="0">
-            <a:spAutoFit/>
-          </a:bodyPr>
-          <a:lstStyle/>
-          <a:p>
-            <a:pPr algn="ctr"/>
-            <a:r>
-              <a:rPr lang="es-MX" dirty="0"/>
-              <a:t>¿ es de madera?</a:t>
-            </a:r>
-          </a:p>
-          <a:p>
-            <a:pPr algn="ctr"/>
-            <a:r>
-              <a:rPr lang="es-MX" dirty="0"/>
-              <a:t>si</a:t>
-            </a:r>
-            <a:endParaRPr lang="es-PE" dirty="0"/>
-          </a:p>
-        </p:txBody>
-      </p:sp>
-      <p:sp>
-        <p:nvSpPr>
-          <p:cNvPr id="20" name="CuadroTexto 19">
-            <a:extLst>
-              <a:ext uri="{FF2B5EF4-FFF2-40B4-BE49-F238E27FC236}">
-                <a16:creationId xmlns:a16="http://schemas.microsoft.com/office/drawing/2014/main" id="{631447AD-97E9-41DF-AB99-8DC87ECF7E1C}"/>
-              </a:ext>
-            </a:extLst>
-          </p:cNvPr>
-          <p:cNvSpPr txBox="1"/>
-          <p:nvPr/>
-        </p:nvSpPr>
-        <p:spPr>
-          <a:xfrm>
-            <a:off x="3400157" y="3638896"/>
-            <a:ext cx="2674039" cy="646331"/>
-          </a:xfrm>
-          <a:prstGeom prst="rect">
-            <a:avLst/>
-          </a:prstGeom>
-          <a:noFill/>
-        </p:spPr>
-        <p:txBody>
-          <a:bodyPr wrap="square" rtlCol="0">
-            <a:spAutoFit/>
-          </a:bodyPr>
-          <a:lstStyle/>
-          <a:p>
-            <a:pPr algn="ctr"/>
-            <a:r>
-              <a:rPr lang="es-MX" dirty="0"/>
-              <a:t>¿ es liviano?</a:t>
-            </a:r>
-          </a:p>
-          <a:p>
-            <a:pPr algn="ctr"/>
-            <a:r>
-              <a:rPr lang="es-MX" dirty="0"/>
-              <a:t>si</a:t>
-            </a:r>
-            <a:endParaRPr lang="es-PE" dirty="0"/>
-          </a:p>
-        </p:txBody>
-      </p:sp>
-      <p:sp>
-        <p:nvSpPr>
-          <p:cNvPr id="21" name="CuadroTexto 20">
-            <a:extLst>
-              <a:ext uri="{FF2B5EF4-FFF2-40B4-BE49-F238E27FC236}">
-                <a16:creationId xmlns:a16="http://schemas.microsoft.com/office/drawing/2014/main" id="{ED283555-EABD-427F-BE21-C62313DF0FDB}"/>
-              </a:ext>
-            </a:extLst>
-          </p:cNvPr>
-          <p:cNvSpPr txBox="1"/>
-          <p:nvPr/>
-        </p:nvSpPr>
-        <p:spPr>
-          <a:xfrm>
-            <a:off x="3435237" y="4223275"/>
-            <a:ext cx="2674039" cy="646331"/>
-          </a:xfrm>
-          <a:prstGeom prst="rect">
-            <a:avLst/>
-          </a:prstGeom>
-          <a:noFill/>
-        </p:spPr>
-        <p:txBody>
-          <a:bodyPr wrap="square" rtlCol="0">
-            <a:spAutoFit/>
-          </a:bodyPr>
-          <a:lstStyle/>
-          <a:p>
-            <a:pPr algn="ctr"/>
-            <a:r>
-              <a:rPr lang="es-MX" dirty="0"/>
-              <a:t>¿ tiene cuerda?</a:t>
-            </a:r>
-          </a:p>
-          <a:p>
-            <a:pPr algn="ctr"/>
-            <a:r>
-              <a:rPr lang="es-MX" dirty="0"/>
-              <a:t>si</a:t>
             </a:r>
             <a:endParaRPr lang="es-PE" dirty="0"/>
           </a:p>
@@ -6982,6 +6713,1945 @@
 </file>
 
 <file path=ppt/slides/slide2.xml><?xml version="1.0" encoding="utf-8"?>
+<p:sld xmlns:a="http://schemas.openxmlformats.org/drawingml/2006/main" xmlns:r="http://schemas.openxmlformats.org/officeDocument/2006/relationships" xmlns:p="http://schemas.openxmlformats.org/presentationml/2006/main">
+  <p:cSld>
+    <p:spTree>
+      <p:nvGrpSpPr>
+        <p:cNvPr id="1" name=""/>
+        <p:cNvGrpSpPr/>
+        <p:nvPr/>
+      </p:nvGrpSpPr>
+      <p:grpSpPr>
+        <a:xfrm>
+          <a:off x="0" y="0"/>
+          <a:ext cx="0" cy="0"/>
+          <a:chOff x="0" y="0"/>
+          <a:chExt cx="0" cy="0"/>
+        </a:xfrm>
+      </p:grpSpPr>
+      <p:pic>
+        <p:nvPicPr>
+          <p:cNvPr id="2052" name="Picture 4" descr="Batería (instrumento musical) - Wikipedia, la enciclopedia libre">
+            <a:extLst>
+              <a:ext uri="{FF2B5EF4-FFF2-40B4-BE49-F238E27FC236}">
+                <a16:creationId xmlns:a16="http://schemas.microsoft.com/office/drawing/2014/main" id="{995B82D8-ED8F-40FD-982D-AFA104D7B10B}"/>
+              </a:ext>
+            </a:extLst>
+          </p:cNvPr>
+          <p:cNvPicPr>
+            <a:picLocks noChangeAspect="1" noChangeArrowheads="1"/>
+          </p:cNvPicPr>
+          <p:nvPr/>
+        </p:nvPicPr>
+        <p:blipFill>
+          <a:blip r:embed="rId2">
+            <a:extLst>
+              <a:ext uri="{28A0092B-C50C-407E-A947-70E740481C1C}">
+                <a14:useLocalDpi xmlns:a14="http://schemas.microsoft.com/office/drawing/2010/main" val="0"/>
+              </a:ext>
+            </a:extLst>
+          </a:blip>
+          <a:srcRect/>
+          <a:stretch>
+            <a:fillRect/>
+          </a:stretch>
+        </p:blipFill>
+        <p:spPr bwMode="auto">
+          <a:xfrm>
+            <a:off x="7421388" y="3732992"/>
+            <a:ext cx="2288209" cy="1727598"/>
+          </a:xfrm>
+          <a:prstGeom prst="rect">
+            <a:avLst/>
+          </a:prstGeom>
+          <a:noFill/>
+          <a:extLst>
+            <a:ext uri="{909E8E84-426E-40DD-AFC4-6F175D3DCCD1}">
+              <a14:hiddenFill xmlns:a14="http://schemas.microsoft.com/office/drawing/2010/main">
+                <a:solidFill>
+                  <a:srgbClr val="FFFFFF"/>
+                </a:solidFill>
+              </a14:hiddenFill>
+            </a:ext>
+          </a:extLst>
+        </p:spPr>
+      </p:pic>
+      <p:pic>
+        <p:nvPicPr>
+          <p:cNvPr id="2058" name="Picture 10" descr="mariachi instrumento musical violin 1206385 PNG">
+            <a:extLst>
+              <a:ext uri="{FF2B5EF4-FFF2-40B4-BE49-F238E27FC236}">
+                <a16:creationId xmlns:a16="http://schemas.microsoft.com/office/drawing/2014/main" id="{EB1E333C-6B1B-490E-81CB-1E825FC86D8C}"/>
+              </a:ext>
+            </a:extLst>
+          </p:cNvPr>
+          <p:cNvPicPr>
+            <a:picLocks noChangeAspect="1" noChangeArrowheads="1"/>
+          </p:cNvPicPr>
+          <p:nvPr/>
+        </p:nvPicPr>
+        <p:blipFill>
+          <a:blip r:embed="rId3">
+            <a:extLst>
+              <a:ext uri="{28A0092B-C50C-407E-A947-70E740481C1C}">
+                <a14:useLocalDpi xmlns:a14="http://schemas.microsoft.com/office/drawing/2010/main" val="0"/>
+              </a:ext>
+            </a:extLst>
+          </a:blip>
+          <a:srcRect/>
+          <a:stretch>
+            <a:fillRect/>
+          </a:stretch>
+        </p:blipFill>
+        <p:spPr bwMode="auto">
+          <a:xfrm rot="1131174">
+            <a:off x="3330574" y="2376372"/>
+            <a:ext cx="972562" cy="1564792"/>
+          </a:xfrm>
+          <a:prstGeom prst="rect">
+            <a:avLst/>
+          </a:prstGeom>
+          <a:noFill/>
+          <a:extLst>
+            <a:ext uri="{909E8E84-426E-40DD-AFC4-6F175D3DCCD1}">
+              <a14:hiddenFill xmlns:a14="http://schemas.microsoft.com/office/drawing/2010/main">
+                <a:solidFill>
+                  <a:srgbClr val="FFFFFF"/>
+                </a:solidFill>
+              </a14:hiddenFill>
+            </a:ext>
+          </a:extLst>
+        </p:spPr>
+      </p:pic>
+      <p:pic>
+        <p:nvPicPr>
+          <p:cNvPr id="2072" name="Picture 24">
+            <a:extLst>
+              <a:ext uri="{FF2B5EF4-FFF2-40B4-BE49-F238E27FC236}">
+                <a16:creationId xmlns:a16="http://schemas.microsoft.com/office/drawing/2014/main" id="{11C1434C-C96B-4ED9-BD96-BE2B57D9C6F7}"/>
+              </a:ext>
+            </a:extLst>
+          </p:cNvPr>
+          <p:cNvPicPr>
+            <a:picLocks noChangeAspect="1" noChangeArrowheads="1"/>
+          </p:cNvPicPr>
+          <p:nvPr/>
+        </p:nvPicPr>
+        <p:blipFill>
+          <a:blip r:embed="rId4">
+            <a:extLst>
+              <a:ext uri="{28A0092B-C50C-407E-A947-70E740481C1C}">
+                <a14:useLocalDpi xmlns:a14="http://schemas.microsoft.com/office/drawing/2010/main" val="0"/>
+              </a:ext>
+            </a:extLst>
+          </a:blip>
+          <a:srcRect/>
+          <a:stretch>
+            <a:fillRect/>
+          </a:stretch>
+        </p:blipFill>
+        <p:spPr bwMode="auto">
+          <a:xfrm>
+            <a:off x="3799090" y="5178256"/>
+            <a:ext cx="1416925" cy="1464732"/>
+          </a:xfrm>
+          <a:prstGeom prst="rect">
+            <a:avLst/>
+          </a:prstGeom>
+          <a:noFill/>
+          <a:extLst>
+            <a:ext uri="{909E8E84-426E-40DD-AFC4-6F175D3DCCD1}">
+              <a14:hiddenFill xmlns:a14="http://schemas.microsoft.com/office/drawing/2010/main">
+                <a:solidFill>
+                  <a:srgbClr val="FFFFFF"/>
+                </a:solidFill>
+              </a14:hiddenFill>
+            </a:ext>
+          </a:extLst>
+        </p:spPr>
+      </p:pic>
+      <p:pic>
+        <p:nvPicPr>
+          <p:cNvPr id="2074" name="Picture 26" descr="Maracas | Club Penguin Wiki | Fandom">
+            <a:extLst>
+              <a:ext uri="{FF2B5EF4-FFF2-40B4-BE49-F238E27FC236}">
+                <a16:creationId xmlns:a16="http://schemas.microsoft.com/office/drawing/2014/main" id="{2B556D2F-3F83-4837-A45F-E2E28860A7A3}"/>
+              </a:ext>
+            </a:extLst>
+          </p:cNvPr>
+          <p:cNvPicPr>
+            <a:picLocks noChangeAspect="1" noChangeArrowheads="1"/>
+          </p:cNvPicPr>
+          <p:nvPr/>
+        </p:nvPicPr>
+        <p:blipFill>
+          <a:blip r:embed="rId5">
+            <a:extLst>
+              <a:ext uri="{28A0092B-C50C-407E-A947-70E740481C1C}">
+                <a14:useLocalDpi xmlns:a14="http://schemas.microsoft.com/office/drawing/2010/main" val="0"/>
+              </a:ext>
+            </a:extLst>
+          </a:blip>
+          <a:srcRect/>
+          <a:stretch>
+            <a:fillRect/>
+          </a:stretch>
+        </p:blipFill>
+        <p:spPr bwMode="auto">
+          <a:xfrm>
+            <a:off x="196403" y="4411782"/>
+            <a:ext cx="1300957" cy="1543993"/>
+          </a:xfrm>
+          <a:prstGeom prst="rect">
+            <a:avLst/>
+          </a:prstGeom>
+          <a:noFill/>
+          <a:extLst>
+            <a:ext uri="{909E8E84-426E-40DD-AFC4-6F175D3DCCD1}">
+              <a14:hiddenFill xmlns:a14="http://schemas.microsoft.com/office/drawing/2010/main">
+                <a:solidFill>
+                  <a:srgbClr val="FFFFFF"/>
+                </a:solidFill>
+              </a14:hiddenFill>
+            </a:ext>
+          </a:extLst>
+        </p:spPr>
+      </p:pic>
+      <p:pic>
+        <p:nvPicPr>
+          <p:cNvPr id="18" name="Picture 6" descr="Tractores Agrícolas | John Deere LA">
+            <a:extLst>
+              <a:ext uri="{FF2B5EF4-FFF2-40B4-BE49-F238E27FC236}">
+                <a16:creationId xmlns:a16="http://schemas.microsoft.com/office/drawing/2014/main" id="{D34156E1-5FE8-481F-8F41-E55409C007F4}"/>
+              </a:ext>
+            </a:extLst>
+          </p:cNvPr>
+          <p:cNvPicPr>
+            <a:picLocks noChangeAspect="1" noChangeArrowheads="1"/>
+          </p:cNvPicPr>
+          <p:nvPr/>
+        </p:nvPicPr>
+        <p:blipFill>
+          <a:blip r:embed="rId6">
+            <a:extLst>
+              <a:ext uri="{28A0092B-C50C-407E-A947-70E740481C1C}">
+                <a14:useLocalDpi xmlns:a14="http://schemas.microsoft.com/office/drawing/2010/main" val="0"/>
+              </a:ext>
+            </a:extLst>
+          </a:blip>
+          <a:srcRect/>
+          <a:stretch>
+            <a:fillRect/>
+          </a:stretch>
+        </p:blipFill>
+        <p:spPr bwMode="auto">
+          <a:xfrm>
+            <a:off x="4571999" y="2609722"/>
+            <a:ext cx="2021457" cy="1459045"/>
+          </a:xfrm>
+          <a:prstGeom prst="rect">
+            <a:avLst/>
+          </a:prstGeom>
+          <a:noFill/>
+          <a:extLst>
+            <a:ext uri="{909E8E84-426E-40DD-AFC4-6F175D3DCCD1}">
+              <a14:hiddenFill xmlns:a14="http://schemas.microsoft.com/office/drawing/2010/main">
+                <a:solidFill>
+                  <a:srgbClr val="FFFFFF"/>
+                </a:solidFill>
+              </a14:hiddenFill>
+            </a:ext>
+          </a:extLst>
+        </p:spPr>
+      </p:pic>
+      <p:pic>
+        <p:nvPicPr>
+          <p:cNvPr id="2076" name="Picture 28" descr="dormido hora objetos acortar Arte dibujos animados alarma reloj 24996848 PNG">
+            <a:extLst>
+              <a:ext uri="{FF2B5EF4-FFF2-40B4-BE49-F238E27FC236}">
+                <a16:creationId xmlns:a16="http://schemas.microsoft.com/office/drawing/2014/main" id="{D2530CFB-65F0-4EB3-AC1B-7229C82890B3}"/>
+              </a:ext>
+            </a:extLst>
+          </p:cNvPr>
+          <p:cNvPicPr>
+            <a:picLocks noChangeAspect="1" noChangeArrowheads="1"/>
+          </p:cNvPicPr>
+          <p:nvPr/>
+        </p:nvPicPr>
+        <p:blipFill>
+          <a:blip r:embed="rId7">
+            <a:extLst>
+              <a:ext uri="{28A0092B-C50C-407E-A947-70E740481C1C}">
+                <a14:useLocalDpi xmlns:a14="http://schemas.microsoft.com/office/drawing/2010/main" val="0"/>
+              </a:ext>
+            </a:extLst>
+          </a:blip>
+          <a:srcRect/>
+          <a:stretch>
+            <a:fillRect/>
+          </a:stretch>
+        </p:blipFill>
+        <p:spPr bwMode="auto">
+          <a:xfrm>
+            <a:off x="5663224" y="4919918"/>
+            <a:ext cx="1761068" cy="1761068"/>
+          </a:xfrm>
+          <a:prstGeom prst="rect">
+            <a:avLst/>
+          </a:prstGeom>
+          <a:noFill/>
+          <a:extLst>
+            <a:ext uri="{909E8E84-426E-40DD-AFC4-6F175D3DCCD1}">
+              <a14:hiddenFill xmlns:a14="http://schemas.microsoft.com/office/drawing/2010/main">
+                <a:solidFill>
+                  <a:srgbClr val="FFFFFF"/>
+                </a:solidFill>
+              </a14:hiddenFill>
+            </a:ext>
+          </a:extLst>
+        </p:spPr>
+      </p:pic>
+      <p:pic>
+        <p:nvPicPr>
+          <p:cNvPr id="2078" name="Picture 30" descr="Toallas De Spa PNG, Vectores, PSD, e Clipart Para Descarga Gratuita -  Pngtree">
+            <a:extLst>
+              <a:ext uri="{FF2B5EF4-FFF2-40B4-BE49-F238E27FC236}">
+                <a16:creationId xmlns:a16="http://schemas.microsoft.com/office/drawing/2014/main" id="{77A9FEA2-BD44-4C4F-893D-9095252E1804}"/>
+              </a:ext>
+            </a:extLst>
+          </p:cNvPr>
+          <p:cNvPicPr>
+            <a:picLocks noChangeAspect="1" noChangeArrowheads="1"/>
+          </p:cNvPicPr>
+          <p:nvPr/>
+        </p:nvPicPr>
+        <p:blipFill>
+          <a:blip r:embed="rId8">
+            <a:extLst>
+              <a:ext uri="{28A0092B-C50C-407E-A947-70E740481C1C}">
+                <a14:useLocalDpi xmlns:a14="http://schemas.microsoft.com/office/drawing/2010/main" val="0"/>
+              </a:ext>
+            </a:extLst>
+          </a:blip>
+          <a:srcRect/>
+          <a:stretch>
+            <a:fillRect/>
+          </a:stretch>
+        </p:blipFill>
+        <p:spPr bwMode="auto">
+          <a:xfrm>
+            <a:off x="469040" y="2357707"/>
+            <a:ext cx="1368973" cy="1026730"/>
+          </a:xfrm>
+          <a:prstGeom prst="rect">
+            <a:avLst/>
+          </a:prstGeom>
+          <a:noFill/>
+          <a:extLst>
+            <a:ext uri="{909E8E84-426E-40DD-AFC4-6F175D3DCCD1}">
+              <a14:hiddenFill xmlns:a14="http://schemas.microsoft.com/office/drawing/2010/main">
+                <a:solidFill>
+                  <a:srgbClr val="FFFFFF"/>
+                </a:solidFill>
+              </a14:hiddenFill>
+            </a:ext>
+          </a:extLst>
+        </p:spPr>
+      </p:pic>
+      <p:pic>
+        <p:nvPicPr>
+          <p:cNvPr id="2080" name="Picture 32" descr="Helado Suave Amarillo PNG ,dibujos Servicio Débil, Helado, Atender PNG  Imagen para Descarga Gratuita | Pngtree">
+            <a:extLst>
+              <a:ext uri="{FF2B5EF4-FFF2-40B4-BE49-F238E27FC236}">
+                <a16:creationId xmlns:a16="http://schemas.microsoft.com/office/drawing/2014/main" id="{15A867C7-E7DA-4E98-816D-5D2998CEEAF1}"/>
+              </a:ext>
+            </a:extLst>
+          </p:cNvPr>
+          <p:cNvPicPr>
+            <a:picLocks noChangeAspect="1" noChangeArrowheads="1"/>
+          </p:cNvPicPr>
+          <p:nvPr/>
+        </p:nvPicPr>
+        <p:blipFill>
+          <a:blip r:embed="rId9">
+            <a:extLst>
+              <a:ext uri="{28A0092B-C50C-407E-A947-70E740481C1C}">
+                <a14:useLocalDpi xmlns:a14="http://schemas.microsoft.com/office/drawing/2010/main" val="0"/>
+              </a:ext>
+            </a:extLst>
+          </a:blip>
+          <a:srcRect/>
+          <a:stretch>
+            <a:fillRect/>
+          </a:stretch>
+        </p:blipFill>
+        <p:spPr bwMode="auto">
+          <a:xfrm>
+            <a:off x="1334118" y="4596791"/>
+            <a:ext cx="2252133" cy="2252133"/>
+          </a:xfrm>
+          <a:prstGeom prst="rect">
+            <a:avLst/>
+          </a:prstGeom>
+          <a:noFill/>
+          <a:extLst>
+            <a:ext uri="{909E8E84-426E-40DD-AFC4-6F175D3DCCD1}">
+              <a14:hiddenFill xmlns:a14="http://schemas.microsoft.com/office/drawing/2010/main">
+                <a:solidFill>
+                  <a:srgbClr val="FFFFFF"/>
+                </a:solidFill>
+              </a14:hiddenFill>
+            </a:ext>
+          </a:extLst>
+        </p:spPr>
+      </p:pic>
+      <p:pic>
+        <p:nvPicPr>
+          <p:cNvPr id="5" name="Imagen 4">
+            <a:extLst>
+              <a:ext uri="{FF2B5EF4-FFF2-40B4-BE49-F238E27FC236}">
+                <a16:creationId xmlns:a16="http://schemas.microsoft.com/office/drawing/2014/main" id="{2173F711-642A-43DB-8C92-EC2CC0FCE492}"/>
+              </a:ext>
+            </a:extLst>
+          </p:cNvPr>
+          <p:cNvPicPr>
+            <a:picLocks noChangeAspect="1"/>
+          </p:cNvPicPr>
+          <p:nvPr/>
+        </p:nvPicPr>
+        <p:blipFill>
+          <a:blip r:embed="rId10"/>
+          <a:stretch>
+            <a:fillRect/>
+          </a:stretch>
+        </p:blipFill>
+        <p:spPr>
+          <a:xfrm>
+            <a:off x="955777" y="3330398"/>
+            <a:ext cx="2148063" cy="1456733"/>
+          </a:xfrm>
+          <a:prstGeom prst="rect">
+            <a:avLst/>
+          </a:prstGeom>
+        </p:spPr>
+      </p:pic>
+      <p:sp>
+        <p:nvSpPr>
+          <p:cNvPr id="15" name="CuadroTexto 14">
+            <a:extLst>
+              <a:ext uri="{FF2B5EF4-FFF2-40B4-BE49-F238E27FC236}">
+                <a16:creationId xmlns:a16="http://schemas.microsoft.com/office/drawing/2014/main" id="{9435F447-E7F3-4557-A1C4-A8DA3BC7B1E9}"/>
+              </a:ext>
+            </a:extLst>
+          </p:cNvPr>
+          <p:cNvSpPr txBox="1"/>
+          <p:nvPr/>
+        </p:nvSpPr>
+        <p:spPr>
+          <a:xfrm>
+            <a:off x="3364653" y="1082460"/>
+            <a:ext cx="2414693" cy="646331"/>
+          </a:xfrm>
+          <a:prstGeom prst="rect">
+            <a:avLst/>
+          </a:prstGeom>
+          <a:noFill/>
+        </p:spPr>
+        <p:txBody>
+          <a:bodyPr wrap="square" rtlCol="0">
+            <a:spAutoFit/>
+          </a:bodyPr>
+          <a:lstStyle/>
+          <a:p>
+            <a:pPr algn="ctr"/>
+            <a:r>
+              <a:rPr lang="es-MX" dirty="0"/>
+              <a:t>¿ es suave o </a:t>
+            </a:r>
+            <a:r>
+              <a:rPr lang="es-MX" dirty="0" err="1"/>
+              <a:t>aspero</a:t>
+            </a:r>
+            <a:r>
+              <a:rPr lang="es-MX" dirty="0"/>
+              <a:t>?</a:t>
+            </a:r>
+          </a:p>
+          <a:p>
+            <a:pPr algn="ctr"/>
+            <a:r>
+              <a:rPr lang="es-MX" dirty="0"/>
+              <a:t>Es </a:t>
+            </a:r>
+            <a:r>
+              <a:rPr lang="es-MX" dirty="0" err="1"/>
+              <a:t>aspero</a:t>
+            </a:r>
+            <a:endParaRPr lang="es-PE" dirty="0"/>
+          </a:p>
+        </p:txBody>
+      </p:sp>
+    </p:spTree>
+    <p:extLst>
+      <p:ext uri="{BB962C8B-B14F-4D97-AF65-F5344CB8AC3E}">
+        <p14:creationId xmlns:p14="http://schemas.microsoft.com/office/powerpoint/2010/main" val="2970525996"/>
+      </p:ext>
+    </p:extLst>
+  </p:cSld>
+  <p:clrMapOvr>
+    <a:masterClrMapping/>
+  </p:clrMapOvr>
+</p:sld>
+</file>
+
+<file path=ppt/slides/slide3.xml><?xml version="1.0" encoding="utf-8"?>
+<p:sld xmlns:a="http://schemas.openxmlformats.org/drawingml/2006/main" xmlns:r="http://schemas.openxmlformats.org/officeDocument/2006/relationships" xmlns:p="http://schemas.openxmlformats.org/presentationml/2006/main">
+  <p:cSld>
+    <p:spTree>
+      <p:nvGrpSpPr>
+        <p:cNvPr id="1" name=""/>
+        <p:cNvGrpSpPr/>
+        <p:nvPr/>
+      </p:nvGrpSpPr>
+      <p:grpSpPr>
+        <a:xfrm>
+          <a:off x="0" y="0"/>
+          <a:ext cx="0" cy="0"/>
+          <a:chOff x="0" y="0"/>
+          <a:chExt cx="0" cy="0"/>
+        </a:xfrm>
+      </p:grpSpPr>
+      <p:pic>
+        <p:nvPicPr>
+          <p:cNvPr id="2052" name="Picture 4" descr="Batería (instrumento musical) - Wikipedia, la enciclopedia libre">
+            <a:extLst>
+              <a:ext uri="{FF2B5EF4-FFF2-40B4-BE49-F238E27FC236}">
+                <a16:creationId xmlns:a16="http://schemas.microsoft.com/office/drawing/2014/main" id="{995B82D8-ED8F-40FD-982D-AFA104D7B10B}"/>
+              </a:ext>
+            </a:extLst>
+          </p:cNvPr>
+          <p:cNvPicPr>
+            <a:picLocks noChangeAspect="1" noChangeArrowheads="1"/>
+          </p:cNvPicPr>
+          <p:nvPr/>
+        </p:nvPicPr>
+        <p:blipFill>
+          <a:blip r:embed="rId2">
+            <a:extLst>
+              <a:ext uri="{28A0092B-C50C-407E-A947-70E740481C1C}">
+                <a14:useLocalDpi xmlns:a14="http://schemas.microsoft.com/office/drawing/2010/main" val="0"/>
+              </a:ext>
+            </a:extLst>
+          </a:blip>
+          <a:srcRect/>
+          <a:stretch>
+            <a:fillRect/>
+          </a:stretch>
+        </p:blipFill>
+        <p:spPr bwMode="auto">
+          <a:xfrm>
+            <a:off x="7471781" y="4314457"/>
+            <a:ext cx="2288209" cy="1727598"/>
+          </a:xfrm>
+          <a:prstGeom prst="rect">
+            <a:avLst/>
+          </a:prstGeom>
+          <a:noFill/>
+          <a:extLst>
+            <a:ext uri="{909E8E84-426E-40DD-AFC4-6F175D3DCCD1}">
+              <a14:hiddenFill xmlns:a14="http://schemas.microsoft.com/office/drawing/2010/main">
+                <a:solidFill>
+                  <a:srgbClr val="FFFFFF"/>
+                </a:solidFill>
+              </a14:hiddenFill>
+            </a:ext>
+          </a:extLst>
+        </p:spPr>
+      </p:pic>
+      <p:pic>
+        <p:nvPicPr>
+          <p:cNvPr id="2058" name="Picture 10" descr="mariachi instrumento musical violin 1206385 PNG">
+            <a:extLst>
+              <a:ext uri="{FF2B5EF4-FFF2-40B4-BE49-F238E27FC236}">
+                <a16:creationId xmlns:a16="http://schemas.microsoft.com/office/drawing/2014/main" id="{EB1E333C-6B1B-490E-81CB-1E825FC86D8C}"/>
+              </a:ext>
+            </a:extLst>
+          </p:cNvPr>
+          <p:cNvPicPr>
+            <a:picLocks noChangeAspect="1" noChangeArrowheads="1"/>
+          </p:cNvPicPr>
+          <p:nvPr/>
+        </p:nvPicPr>
+        <p:blipFill>
+          <a:blip r:embed="rId3">
+            <a:extLst>
+              <a:ext uri="{28A0092B-C50C-407E-A947-70E740481C1C}">
+                <a14:useLocalDpi xmlns:a14="http://schemas.microsoft.com/office/drawing/2010/main" val="0"/>
+              </a:ext>
+            </a:extLst>
+          </a:blip>
+          <a:srcRect/>
+          <a:stretch>
+            <a:fillRect/>
+          </a:stretch>
+        </p:blipFill>
+        <p:spPr bwMode="auto">
+          <a:xfrm rot="1131174">
+            <a:off x="3905550" y="3107178"/>
+            <a:ext cx="972562" cy="1564792"/>
+          </a:xfrm>
+          <a:prstGeom prst="rect">
+            <a:avLst/>
+          </a:prstGeom>
+          <a:noFill/>
+          <a:extLst>
+            <a:ext uri="{909E8E84-426E-40DD-AFC4-6F175D3DCCD1}">
+              <a14:hiddenFill xmlns:a14="http://schemas.microsoft.com/office/drawing/2010/main">
+                <a:solidFill>
+                  <a:srgbClr val="FFFFFF"/>
+                </a:solidFill>
+              </a14:hiddenFill>
+            </a:ext>
+          </a:extLst>
+        </p:spPr>
+      </p:pic>
+      <p:pic>
+        <p:nvPicPr>
+          <p:cNvPr id="2072" name="Picture 24">
+            <a:extLst>
+              <a:ext uri="{FF2B5EF4-FFF2-40B4-BE49-F238E27FC236}">
+                <a16:creationId xmlns:a16="http://schemas.microsoft.com/office/drawing/2014/main" id="{11C1434C-C96B-4ED9-BD96-BE2B57D9C6F7}"/>
+              </a:ext>
+            </a:extLst>
+          </p:cNvPr>
+          <p:cNvPicPr>
+            <a:picLocks noChangeAspect="1" noChangeArrowheads="1"/>
+          </p:cNvPicPr>
+          <p:nvPr/>
+        </p:nvPicPr>
+        <p:blipFill>
+          <a:blip r:embed="rId4">
+            <a:extLst>
+              <a:ext uri="{28A0092B-C50C-407E-A947-70E740481C1C}">
+                <a14:useLocalDpi xmlns:a14="http://schemas.microsoft.com/office/drawing/2010/main" val="0"/>
+              </a:ext>
+            </a:extLst>
+          </a:blip>
+          <a:srcRect/>
+          <a:stretch>
+            <a:fillRect/>
+          </a:stretch>
+        </p:blipFill>
+        <p:spPr bwMode="auto">
+          <a:xfrm>
+            <a:off x="3799090" y="5178256"/>
+            <a:ext cx="1416925" cy="1464732"/>
+          </a:xfrm>
+          <a:prstGeom prst="rect">
+            <a:avLst/>
+          </a:prstGeom>
+          <a:noFill/>
+          <a:extLst>
+            <a:ext uri="{909E8E84-426E-40DD-AFC4-6F175D3DCCD1}">
+              <a14:hiddenFill xmlns:a14="http://schemas.microsoft.com/office/drawing/2010/main">
+                <a:solidFill>
+                  <a:srgbClr val="FFFFFF"/>
+                </a:solidFill>
+              </a14:hiddenFill>
+            </a:ext>
+          </a:extLst>
+        </p:spPr>
+      </p:pic>
+      <p:pic>
+        <p:nvPicPr>
+          <p:cNvPr id="2074" name="Picture 26" descr="Maracas | Club Penguin Wiki | Fandom">
+            <a:extLst>
+              <a:ext uri="{FF2B5EF4-FFF2-40B4-BE49-F238E27FC236}">
+                <a16:creationId xmlns:a16="http://schemas.microsoft.com/office/drawing/2014/main" id="{2B556D2F-3F83-4837-A45F-E2E28860A7A3}"/>
+              </a:ext>
+            </a:extLst>
+          </p:cNvPr>
+          <p:cNvPicPr>
+            <a:picLocks noChangeAspect="1" noChangeArrowheads="1"/>
+          </p:cNvPicPr>
+          <p:nvPr/>
+        </p:nvPicPr>
+        <p:blipFill>
+          <a:blip r:embed="rId5">
+            <a:extLst>
+              <a:ext uri="{28A0092B-C50C-407E-A947-70E740481C1C}">
+                <a14:useLocalDpi xmlns:a14="http://schemas.microsoft.com/office/drawing/2010/main" val="0"/>
+              </a:ext>
+            </a:extLst>
+          </a:blip>
+          <a:srcRect/>
+          <a:stretch>
+            <a:fillRect/>
+          </a:stretch>
+        </p:blipFill>
+        <p:spPr bwMode="auto">
+          <a:xfrm>
+            <a:off x="196403" y="4411782"/>
+            <a:ext cx="1300957" cy="1543993"/>
+          </a:xfrm>
+          <a:prstGeom prst="rect">
+            <a:avLst/>
+          </a:prstGeom>
+          <a:noFill/>
+          <a:extLst>
+            <a:ext uri="{909E8E84-426E-40DD-AFC4-6F175D3DCCD1}">
+              <a14:hiddenFill xmlns:a14="http://schemas.microsoft.com/office/drawing/2010/main">
+                <a:solidFill>
+                  <a:srgbClr val="FFFFFF"/>
+                </a:solidFill>
+              </a14:hiddenFill>
+            </a:ext>
+          </a:extLst>
+        </p:spPr>
+      </p:pic>
+      <p:pic>
+        <p:nvPicPr>
+          <p:cNvPr id="18" name="Picture 6" descr="Tractores Agrícolas | John Deere LA">
+            <a:extLst>
+              <a:ext uri="{FF2B5EF4-FFF2-40B4-BE49-F238E27FC236}">
+                <a16:creationId xmlns:a16="http://schemas.microsoft.com/office/drawing/2014/main" id="{D34156E1-5FE8-481F-8F41-E55409C007F4}"/>
+              </a:ext>
+            </a:extLst>
+          </p:cNvPr>
+          <p:cNvPicPr>
+            <a:picLocks noChangeAspect="1" noChangeArrowheads="1"/>
+          </p:cNvPicPr>
+          <p:nvPr/>
+        </p:nvPicPr>
+        <p:blipFill>
+          <a:blip r:embed="rId6">
+            <a:extLst>
+              <a:ext uri="{28A0092B-C50C-407E-A947-70E740481C1C}">
+                <a14:useLocalDpi xmlns:a14="http://schemas.microsoft.com/office/drawing/2010/main" val="0"/>
+              </a:ext>
+            </a:extLst>
+          </a:blip>
+          <a:srcRect/>
+          <a:stretch>
+            <a:fillRect/>
+          </a:stretch>
+        </p:blipFill>
+        <p:spPr bwMode="auto">
+          <a:xfrm>
+            <a:off x="7162800" y="2699477"/>
+            <a:ext cx="2021457" cy="1459045"/>
+          </a:xfrm>
+          <a:prstGeom prst="rect">
+            <a:avLst/>
+          </a:prstGeom>
+          <a:noFill/>
+          <a:extLst>
+            <a:ext uri="{909E8E84-426E-40DD-AFC4-6F175D3DCCD1}">
+              <a14:hiddenFill xmlns:a14="http://schemas.microsoft.com/office/drawing/2010/main">
+                <a:solidFill>
+                  <a:srgbClr val="FFFFFF"/>
+                </a:solidFill>
+              </a14:hiddenFill>
+            </a:ext>
+          </a:extLst>
+        </p:spPr>
+      </p:pic>
+      <p:pic>
+        <p:nvPicPr>
+          <p:cNvPr id="2076" name="Picture 28" descr="dormido hora objetos acortar Arte dibujos animados alarma reloj 24996848 PNG">
+            <a:extLst>
+              <a:ext uri="{FF2B5EF4-FFF2-40B4-BE49-F238E27FC236}">
+                <a16:creationId xmlns:a16="http://schemas.microsoft.com/office/drawing/2014/main" id="{D2530CFB-65F0-4EB3-AC1B-7229C82890B3}"/>
+              </a:ext>
+            </a:extLst>
+          </p:cNvPr>
+          <p:cNvPicPr>
+            <a:picLocks noChangeAspect="1" noChangeArrowheads="1"/>
+          </p:cNvPicPr>
+          <p:nvPr/>
+        </p:nvPicPr>
+        <p:blipFill>
+          <a:blip r:embed="rId7">
+            <a:extLst>
+              <a:ext uri="{28A0092B-C50C-407E-A947-70E740481C1C}">
+                <a14:useLocalDpi xmlns:a14="http://schemas.microsoft.com/office/drawing/2010/main" val="0"/>
+              </a:ext>
+            </a:extLst>
+          </a:blip>
+          <a:srcRect/>
+          <a:stretch>
+            <a:fillRect/>
+          </a:stretch>
+        </p:blipFill>
+        <p:spPr bwMode="auto">
+          <a:xfrm>
+            <a:off x="5663224" y="4919918"/>
+            <a:ext cx="1761068" cy="1761068"/>
+          </a:xfrm>
+          <a:prstGeom prst="rect">
+            <a:avLst/>
+          </a:prstGeom>
+          <a:noFill/>
+          <a:extLst>
+            <a:ext uri="{909E8E84-426E-40DD-AFC4-6F175D3DCCD1}">
+              <a14:hiddenFill xmlns:a14="http://schemas.microsoft.com/office/drawing/2010/main">
+                <a:solidFill>
+                  <a:srgbClr val="FFFFFF"/>
+                </a:solidFill>
+              </a14:hiddenFill>
+            </a:ext>
+          </a:extLst>
+        </p:spPr>
+      </p:pic>
+      <p:pic>
+        <p:nvPicPr>
+          <p:cNvPr id="5" name="Imagen 4">
+            <a:extLst>
+              <a:ext uri="{FF2B5EF4-FFF2-40B4-BE49-F238E27FC236}">
+                <a16:creationId xmlns:a16="http://schemas.microsoft.com/office/drawing/2014/main" id="{2173F711-642A-43DB-8C92-EC2CC0FCE492}"/>
+              </a:ext>
+            </a:extLst>
+          </p:cNvPr>
+          <p:cNvPicPr>
+            <a:picLocks noChangeAspect="1"/>
+          </p:cNvPicPr>
+          <p:nvPr/>
+        </p:nvPicPr>
+        <p:blipFill>
+          <a:blip r:embed="rId8"/>
+          <a:stretch>
+            <a:fillRect/>
+          </a:stretch>
+        </p:blipFill>
+        <p:spPr>
+          <a:xfrm>
+            <a:off x="955777" y="3330398"/>
+            <a:ext cx="2148063" cy="1456733"/>
+          </a:xfrm>
+          <a:prstGeom prst="rect">
+            <a:avLst/>
+          </a:prstGeom>
+        </p:spPr>
+      </p:pic>
+      <p:sp>
+        <p:nvSpPr>
+          <p:cNvPr id="16" name="CuadroTexto 15">
+            <a:extLst>
+              <a:ext uri="{FF2B5EF4-FFF2-40B4-BE49-F238E27FC236}">
+                <a16:creationId xmlns:a16="http://schemas.microsoft.com/office/drawing/2014/main" id="{DE771697-5F17-428E-A11B-40330E03A600}"/>
+              </a:ext>
+            </a:extLst>
+          </p:cNvPr>
+          <p:cNvSpPr txBox="1"/>
+          <p:nvPr/>
+        </p:nvSpPr>
+        <p:spPr>
+          <a:xfrm>
+            <a:off x="3433670" y="2210422"/>
+            <a:ext cx="2674039" cy="646331"/>
+          </a:xfrm>
+          <a:prstGeom prst="rect">
+            <a:avLst/>
+          </a:prstGeom>
+          <a:noFill/>
+        </p:spPr>
+        <p:txBody>
+          <a:bodyPr wrap="square" rtlCol="0">
+            <a:spAutoFit/>
+          </a:bodyPr>
+          <a:lstStyle/>
+          <a:p>
+            <a:pPr algn="ctr"/>
+            <a:r>
+              <a:rPr lang="es-MX" dirty="0"/>
+              <a:t>¿ su sonido es melodioso?</a:t>
+            </a:r>
+          </a:p>
+          <a:p>
+            <a:pPr algn="ctr"/>
+            <a:r>
+              <a:rPr lang="es-MX" dirty="0"/>
+              <a:t>si</a:t>
+            </a:r>
+            <a:endParaRPr lang="es-PE" dirty="0"/>
+          </a:p>
+        </p:txBody>
+      </p:sp>
+    </p:spTree>
+    <p:extLst>
+      <p:ext uri="{BB962C8B-B14F-4D97-AF65-F5344CB8AC3E}">
+        <p14:creationId xmlns:p14="http://schemas.microsoft.com/office/powerpoint/2010/main" val="3537798479"/>
+      </p:ext>
+    </p:extLst>
+  </p:cSld>
+  <p:clrMapOvr>
+    <a:masterClrMapping/>
+  </p:clrMapOvr>
+</p:sld>
+</file>
+
+<file path=ppt/slides/slide4.xml><?xml version="1.0" encoding="utf-8"?>
+<p:sld xmlns:a="http://schemas.openxmlformats.org/drawingml/2006/main" xmlns:r="http://schemas.openxmlformats.org/officeDocument/2006/relationships" xmlns:p="http://schemas.openxmlformats.org/presentationml/2006/main">
+  <p:cSld>
+    <p:spTree>
+      <p:nvGrpSpPr>
+        <p:cNvPr id="1" name=""/>
+        <p:cNvGrpSpPr/>
+        <p:nvPr/>
+      </p:nvGrpSpPr>
+      <p:grpSpPr>
+        <a:xfrm>
+          <a:off x="0" y="0"/>
+          <a:ext cx="0" cy="0"/>
+          <a:chOff x="0" y="0"/>
+          <a:chExt cx="0" cy="0"/>
+        </a:xfrm>
+      </p:grpSpPr>
+      <p:pic>
+        <p:nvPicPr>
+          <p:cNvPr id="2052" name="Picture 4" descr="Batería (instrumento musical) - Wikipedia, la enciclopedia libre">
+            <a:extLst>
+              <a:ext uri="{FF2B5EF4-FFF2-40B4-BE49-F238E27FC236}">
+                <a16:creationId xmlns:a16="http://schemas.microsoft.com/office/drawing/2014/main" id="{995B82D8-ED8F-40FD-982D-AFA104D7B10B}"/>
+              </a:ext>
+            </a:extLst>
+          </p:cNvPr>
+          <p:cNvPicPr>
+            <a:picLocks noChangeAspect="1" noChangeArrowheads="1"/>
+          </p:cNvPicPr>
+          <p:nvPr/>
+        </p:nvPicPr>
+        <p:blipFill>
+          <a:blip r:embed="rId2">
+            <a:extLst>
+              <a:ext uri="{28A0092B-C50C-407E-A947-70E740481C1C}">
+                <a14:useLocalDpi xmlns:a14="http://schemas.microsoft.com/office/drawing/2010/main" val="0"/>
+              </a:ext>
+            </a:extLst>
+          </a:blip>
+          <a:srcRect/>
+          <a:stretch>
+            <a:fillRect/>
+          </a:stretch>
+        </p:blipFill>
+        <p:spPr bwMode="auto">
+          <a:xfrm>
+            <a:off x="7298749" y="3040334"/>
+            <a:ext cx="2288209" cy="1727598"/>
+          </a:xfrm>
+          <a:prstGeom prst="rect">
+            <a:avLst/>
+          </a:prstGeom>
+          <a:noFill/>
+          <a:extLst>
+            <a:ext uri="{909E8E84-426E-40DD-AFC4-6F175D3DCCD1}">
+              <a14:hiddenFill xmlns:a14="http://schemas.microsoft.com/office/drawing/2010/main">
+                <a:solidFill>
+                  <a:srgbClr val="FFFFFF"/>
+                </a:solidFill>
+              </a14:hiddenFill>
+            </a:ext>
+          </a:extLst>
+        </p:spPr>
+      </p:pic>
+      <p:pic>
+        <p:nvPicPr>
+          <p:cNvPr id="2058" name="Picture 10" descr="mariachi instrumento musical violin 1206385 PNG">
+            <a:extLst>
+              <a:ext uri="{FF2B5EF4-FFF2-40B4-BE49-F238E27FC236}">
+                <a16:creationId xmlns:a16="http://schemas.microsoft.com/office/drawing/2014/main" id="{EB1E333C-6B1B-490E-81CB-1E825FC86D8C}"/>
+              </a:ext>
+            </a:extLst>
+          </p:cNvPr>
+          <p:cNvPicPr>
+            <a:picLocks noChangeAspect="1" noChangeArrowheads="1"/>
+          </p:cNvPicPr>
+          <p:nvPr/>
+        </p:nvPicPr>
+        <p:blipFill>
+          <a:blip r:embed="rId3">
+            <a:extLst>
+              <a:ext uri="{28A0092B-C50C-407E-A947-70E740481C1C}">
+                <a14:useLocalDpi xmlns:a14="http://schemas.microsoft.com/office/drawing/2010/main" val="0"/>
+              </a:ext>
+            </a:extLst>
+          </a:blip>
+          <a:srcRect/>
+          <a:stretch>
+            <a:fillRect/>
+          </a:stretch>
+        </p:blipFill>
+        <p:spPr bwMode="auto">
+          <a:xfrm rot="1131174">
+            <a:off x="4922637" y="3544161"/>
+            <a:ext cx="972562" cy="1564792"/>
+          </a:xfrm>
+          <a:prstGeom prst="rect">
+            <a:avLst/>
+          </a:prstGeom>
+          <a:noFill/>
+          <a:extLst>
+            <a:ext uri="{909E8E84-426E-40DD-AFC4-6F175D3DCCD1}">
+              <a14:hiddenFill xmlns:a14="http://schemas.microsoft.com/office/drawing/2010/main">
+                <a:solidFill>
+                  <a:srgbClr val="FFFFFF"/>
+                </a:solidFill>
+              </a14:hiddenFill>
+            </a:ext>
+          </a:extLst>
+        </p:spPr>
+      </p:pic>
+      <p:pic>
+        <p:nvPicPr>
+          <p:cNvPr id="2072" name="Picture 24">
+            <a:extLst>
+              <a:ext uri="{FF2B5EF4-FFF2-40B4-BE49-F238E27FC236}">
+                <a16:creationId xmlns:a16="http://schemas.microsoft.com/office/drawing/2014/main" id="{11C1434C-C96B-4ED9-BD96-BE2B57D9C6F7}"/>
+              </a:ext>
+            </a:extLst>
+          </p:cNvPr>
+          <p:cNvPicPr>
+            <a:picLocks noChangeAspect="1" noChangeArrowheads="1"/>
+          </p:cNvPicPr>
+          <p:nvPr/>
+        </p:nvPicPr>
+        <p:blipFill>
+          <a:blip r:embed="rId4">
+            <a:extLst>
+              <a:ext uri="{28A0092B-C50C-407E-A947-70E740481C1C}">
+                <a14:useLocalDpi xmlns:a14="http://schemas.microsoft.com/office/drawing/2010/main" val="0"/>
+              </a:ext>
+            </a:extLst>
+          </a:blip>
+          <a:srcRect/>
+          <a:stretch>
+            <a:fillRect/>
+          </a:stretch>
+        </p:blipFill>
+        <p:spPr bwMode="auto">
+          <a:xfrm>
+            <a:off x="3799090" y="5178256"/>
+            <a:ext cx="1416925" cy="1464732"/>
+          </a:xfrm>
+          <a:prstGeom prst="rect">
+            <a:avLst/>
+          </a:prstGeom>
+          <a:noFill/>
+          <a:extLst>
+            <a:ext uri="{909E8E84-426E-40DD-AFC4-6F175D3DCCD1}">
+              <a14:hiddenFill xmlns:a14="http://schemas.microsoft.com/office/drawing/2010/main">
+                <a:solidFill>
+                  <a:srgbClr val="FFFFFF"/>
+                </a:solidFill>
+              </a14:hiddenFill>
+            </a:ext>
+          </a:extLst>
+        </p:spPr>
+      </p:pic>
+      <p:pic>
+        <p:nvPicPr>
+          <p:cNvPr id="2074" name="Picture 26" descr="Maracas | Club Penguin Wiki | Fandom">
+            <a:extLst>
+              <a:ext uri="{FF2B5EF4-FFF2-40B4-BE49-F238E27FC236}">
+                <a16:creationId xmlns:a16="http://schemas.microsoft.com/office/drawing/2014/main" id="{2B556D2F-3F83-4837-A45F-E2E28860A7A3}"/>
+              </a:ext>
+            </a:extLst>
+          </p:cNvPr>
+          <p:cNvPicPr>
+            <a:picLocks noChangeAspect="1" noChangeArrowheads="1"/>
+          </p:cNvPicPr>
+          <p:nvPr/>
+        </p:nvPicPr>
+        <p:blipFill>
+          <a:blip r:embed="rId5">
+            <a:extLst>
+              <a:ext uri="{28A0092B-C50C-407E-A947-70E740481C1C}">
+                <a14:useLocalDpi xmlns:a14="http://schemas.microsoft.com/office/drawing/2010/main" val="0"/>
+              </a:ext>
+            </a:extLst>
+          </a:blip>
+          <a:srcRect/>
+          <a:stretch>
+            <a:fillRect/>
+          </a:stretch>
+        </p:blipFill>
+        <p:spPr bwMode="auto">
+          <a:xfrm>
+            <a:off x="196403" y="4411782"/>
+            <a:ext cx="1300957" cy="1543993"/>
+          </a:xfrm>
+          <a:prstGeom prst="rect">
+            <a:avLst/>
+          </a:prstGeom>
+          <a:noFill/>
+          <a:extLst>
+            <a:ext uri="{909E8E84-426E-40DD-AFC4-6F175D3DCCD1}">
+              <a14:hiddenFill xmlns:a14="http://schemas.microsoft.com/office/drawing/2010/main">
+                <a:solidFill>
+                  <a:srgbClr val="FFFFFF"/>
+                </a:solidFill>
+              </a14:hiddenFill>
+            </a:ext>
+          </a:extLst>
+        </p:spPr>
+      </p:pic>
+      <p:pic>
+        <p:nvPicPr>
+          <p:cNvPr id="2076" name="Picture 28" descr="dormido hora objetos acortar Arte dibujos animados alarma reloj 24996848 PNG">
+            <a:extLst>
+              <a:ext uri="{FF2B5EF4-FFF2-40B4-BE49-F238E27FC236}">
+                <a16:creationId xmlns:a16="http://schemas.microsoft.com/office/drawing/2014/main" id="{D2530CFB-65F0-4EB3-AC1B-7229C82890B3}"/>
+              </a:ext>
+            </a:extLst>
+          </p:cNvPr>
+          <p:cNvPicPr>
+            <a:picLocks noChangeAspect="1" noChangeArrowheads="1"/>
+          </p:cNvPicPr>
+          <p:nvPr/>
+        </p:nvPicPr>
+        <p:blipFill>
+          <a:blip r:embed="rId6">
+            <a:extLst>
+              <a:ext uri="{28A0092B-C50C-407E-A947-70E740481C1C}">
+                <a14:useLocalDpi xmlns:a14="http://schemas.microsoft.com/office/drawing/2010/main" val="0"/>
+              </a:ext>
+            </a:extLst>
+          </a:blip>
+          <a:srcRect/>
+          <a:stretch>
+            <a:fillRect/>
+          </a:stretch>
+        </p:blipFill>
+        <p:spPr bwMode="auto">
+          <a:xfrm>
+            <a:off x="5663224" y="4919918"/>
+            <a:ext cx="1761068" cy="1761068"/>
+          </a:xfrm>
+          <a:prstGeom prst="rect">
+            <a:avLst/>
+          </a:prstGeom>
+          <a:noFill/>
+          <a:extLst>
+            <a:ext uri="{909E8E84-426E-40DD-AFC4-6F175D3DCCD1}">
+              <a14:hiddenFill xmlns:a14="http://schemas.microsoft.com/office/drawing/2010/main">
+                <a:solidFill>
+                  <a:srgbClr val="FFFFFF"/>
+                </a:solidFill>
+              </a14:hiddenFill>
+            </a:ext>
+          </a:extLst>
+        </p:spPr>
+      </p:pic>
+      <p:pic>
+        <p:nvPicPr>
+          <p:cNvPr id="5" name="Imagen 4">
+            <a:extLst>
+              <a:ext uri="{FF2B5EF4-FFF2-40B4-BE49-F238E27FC236}">
+                <a16:creationId xmlns:a16="http://schemas.microsoft.com/office/drawing/2014/main" id="{2173F711-642A-43DB-8C92-EC2CC0FCE492}"/>
+              </a:ext>
+            </a:extLst>
+          </p:cNvPr>
+          <p:cNvPicPr>
+            <a:picLocks noChangeAspect="1"/>
+          </p:cNvPicPr>
+          <p:nvPr/>
+        </p:nvPicPr>
+        <p:blipFill>
+          <a:blip r:embed="rId7"/>
+          <a:stretch>
+            <a:fillRect/>
+          </a:stretch>
+        </p:blipFill>
+        <p:spPr>
+          <a:xfrm>
+            <a:off x="955777" y="3330398"/>
+            <a:ext cx="2148063" cy="1456733"/>
+          </a:xfrm>
+          <a:prstGeom prst="rect">
+            <a:avLst/>
+          </a:prstGeom>
+        </p:spPr>
+      </p:pic>
+      <p:sp>
+        <p:nvSpPr>
+          <p:cNvPr id="17" name="CuadroTexto 16">
+            <a:extLst>
+              <a:ext uri="{FF2B5EF4-FFF2-40B4-BE49-F238E27FC236}">
+                <a16:creationId xmlns:a16="http://schemas.microsoft.com/office/drawing/2014/main" id="{4BAC4DF6-3FDA-4BF6-A6D2-2F5155659D82}"/>
+              </a:ext>
+            </a:extLst>
+          </p:cNvPr>
+          <p:cNvSpPr txBox="1"/>
+          <p:nvPr/>
+        </p:nvSpPr>
+        <p:spPr>
+          <a:xfrm>
+            <a:off x="3358883" y="2406443"/>
+            <a:ext cx="2674039" cy="646331"/>
+          </a:xfrm>
+          <a:prstGeom prst="rect">
+            <a:avLst/>
+          </a:prstGeom>
+          <a:noFill/>
+        </p:spPr>
+        <p:txBody>
+          <a:bodyPr wrap="square" rtlCol="0">
+            <a:spAutoFit/>
+          </a:bodyPr>
+          <a:lstStyle/>
+          <a:p>
+            <a:pPr algn="ctr"/>
+            <a:r>
+              <a:rPr lang="es-MX" dirty="0"/>
+              <a:t>¿ es un instrumento musical?</a:t>
+            </a:r>
+          </a:p>
+          <a:p>
+            <a:pPr algn="ctr"/>
+            <a:r>
+              <a:rPr lang="es-MX" dirty="0"/>
+              <a:t>si</a:t>
+            </a:r>
+            <a:endParaRPr lang="es-PE" dirty="0"/>
+          </a:p>
+        </p:txBody>
+      </p:sp>
+    </p:spTree>
+    <p:extLst>
+      <p:ext uri="{BB962C8B-B14F-4D97-AF65-F5344CB8AC3E}">
+        <p14:creationId xmlns:p14="http://schemas.microsoft.com/office/powerpoint/2010/main" val="3000244891"/>
+      </p:ext>
+    </p:extLst>
+  </p:cSld>
+  <p:clrMapOvr>
+    <a:masterClrMapping/>
+  </p:clrMapOvr>
+</p:sld>
+</file>
+
+<file path=ppt/slides/slide5.xml><?xml version="1.0" encoding="utf-8"?>
+<p:sld xmlns:a="http://schemas.openxmlformats.org/drawingml/2006/main" xmlns:r="http://schemas.openxmlformats.org/officeDocument/2006/relationships" xmlns:p="http://schemas.openxmlformats.org/presentationml/2006/main">
+  <p:cSld>
+    <p:spTree>
+      <p:nvGrpSpPr>
+        <p:cNvPr id="1" name=""/>
+        <p:cNvGrpSpPr/>
+        <p:nvPr/>
+      </p:nvGrpSpPr>
+      <p:grpSpPr>
+        <a:xfrm>
+          <a:off x="0" y="0"/>
+          <a:ext cx="0" cy="0"/>
+          <a:chOff x="0" y="0"/>
+          <a:chExt cx="0" cy="0"/>
+        </a:xfrm>
+      </p:grpSpPr>
+      <p:pic>
+        <p:nvPicPr>
+          <p:cNvPr id="2052" name="Picture 4" descr="Batería (instrumento musical) - Wikipedia, la enciclopedia libre">
+            <a:extLst>
+              <a:ext uri="{FF2B5EF4-FFF2-40B4-BE49-F238E27FC236}">
+                <a16:creationId xmlns:a16="http://schemas.microsoft.com/office/drawing/2014/main" id="{995B82D8-ED8F-40FD-982D-AFA104D7B10B}"/>
+              </a:ext>
+            </a:extLst>
+          </p:cNvPr>
+          <p:cNvPicPr>
+            <a:picLocks noChangeAspect="1" noChangeArrowheads="1"/>
+          </p:cNvPicPr>
+          <p:nvPr/>
+        </p:nvPicPr>
+        <p:blipFill>
+          <a:blip r:embed="rId2">
+            <a:extLst>
+              <a:ext uri="{28A0092B-C50C-407E-A947-70E740481C1C}">
+                <a14:useLocalDpi xmlns:a14="http://schemas.microsoft.com/office/drawing/2010/main" val="0"/>
+              </a:ext>
+            </a:extLst>
+          </a:blip>
+          <a:srcRect/>
+          <a:stretch>
+            <a:fillRect/>
+          </a:stretch>
+        </p:blipFill>
+        <p:spPr bwMode="auto">
+          <a:xfrm>
+            <a:off x="7298749" y="3336668"/>
+            <a:ext cx="2288209" cy="1727598"/>
+          </a:xfrm>
+          <a:prstGeom prst="rect">
+            <a:avLst/>
+          </a:prstGeom>
+          <a:noFill/>
+          <a:extLst>
+            <a:ext uri="{909E8E84-426E-40DD-AFC4-6F175D3DCCD1}">
+              <a14:hiddenFill xmlns:a14="http://schemas.microsoft.com/office/drawing/2010/main">
+                <a:solidFill>
+                  <a:srgbClr val="FFFFFF"/>
+                </a:solidFill>
+              </a14:hiddenFill>
+            </a:ext>
+          </a:extLst>
+        </p:spPr>
+      </p:pic>
+      <p:pic>
+        <p:nvPicPr>
+          <p:cNvPr id="2058" name="Picture 10" descr="mariachi instrumento musical violin 1206385 PNG">
+            <a:extLst>
+              <a:ext uri="{FF2B5EF4-FFF2-40B4-BE49-F238E27FC236}">
+                <a16:creationId xmlns:a16="http://schemas.microsoft.com/office/drawing/2014/main" id="{EB1E333C-6B1B-490E-81CB-1E825FC86D8C}"/>
+              </a:ext>
+            </a:extLst>
+          </p:cNvPr>
+          <p:cNvPicPr>
+            <a:picLocks noChangeAspect="1" noChangeArrowheads="1"/>
+          </p:cNvPicPr>
+          <p:nvPr/>
+        </p:nvPicPr>
+        <p:blipFill>
+          <a:blip r:embed="rId3">
+            <a:extLst>
+              <a:ext uri="{28A0092B-C50C-407E-A947-70E740481C1C}">
+                <a14:useLocalDpi xmlns:a14="http://schemas.microsoft.com/office/drawing/2010/main" val="0"/>
+              </a:ext>
+            </a:extLst>
+          </a:blip>
+          <a:srcRect/>
+          <a:stretch>
+            <a:fillRect/>
+          </a:stretch>
+        </p:blipFill>
+        <p:spPr bwMode="auto">
+          <a:xfrm rot="1131174">
+            <a:off x="5554909" y="4019296"/>
+            <a:ext cx="972562" cy="1564792"/>
+          </a:xfrm>
+          <a:prstGeom prst="rect">
+            <a:avLst/>
+          </a:prstGeom>
+          <a:noFill/>
+          <a:extLst>
+            <a:ext uri="{909E8E84-426E-40DD-AFC4-6F175D3DCCD1}">
+              <a14:hiddenFill xmlns:a14="http://schemas.microsoft.com/office/drawing/2010/main">
+                <a:solidFill>
+                  <a:srgbClr val="FFFFFF"/>
+                </a:solidFill>
+              </a14:hiddenFill>
+            </a:ext>
+          </a:extLst>
+        </p:spPr>
+      </p:pic>
+      <p:pic>
+        <p:nvPicPr>
+          <p:cNvPr id="2072" name="Picture 24">
+            <a:extLst>
+              <a:ext uri="{FF2B5EF4-FFF2-40B4-BE49-F238E27FC236}">
+                <a16:creationId xmlns:a16="http://schemas.microsoft.com/office/drawing/2014/main" id="{11C1434C-C96B-4ED9-BD96-BE2B57D9C6F7}"/>
+              </a:ext>
+            </a:extLst>
+          </p:cNvPr>
+          <p:cNvPicPr>
+            <a:picLocks noChangeAspect="1" noChangeArrowheads="1"/>
+          </p:cNvPicPr>
+          <p:nvPr/>
+        </p:nvPicPr>
+        <p:blipFill>
+          <a:blip r:embed="rId4">
+            <a:extLst>
+              <a:ext uri="{28A0092B-C50C-407E-A947-70E740481C1C}">
+                <a14:useLocalDpi xmlns:a14="http://schemas.microsoft.com/office/drawing/2010/main" val="0"/>
+              </a:ext>
+            </a:extLst>
+          </a:blip>
+          <a:srcRect/>
+          <a:stretch>
+            <a:fillRect/>
+          </a:stretch>
+        </p:blipFill>
+        <p:spPr bwMode="auto">
+          <a:xfrm>
+            <a:off x="2533006" y="4491043"/>
+            <a:ext cx="1416925" cy="1464732"/>
+          </a:xfrm>
+          <a:prstGeom prst="rect">
+            <a:avLst/>
+          </a:prstGeom>
+          <a:noFill/>
+          <a:extLst>
+            <a:ext uri="{909E8E84-426E-40DD-AFC4-6F175D3DCCD1}">
+              <a14:hiddenFill xmlns:a14="http://schemas.microsoft.com/office/drawing/2010/main">
+                <a:solidFill>
+                  <a:srgbClr val="FFFFFF"/>
+                </a:solidFill>
+              </a14:hiddenFill>
+            </a:ext>
+          </a:extLst>
+        </p:spPr>
+      </p:pic>
+      <p:pic>
+        <p:nvPicPr>
+          <p:cNvPr id="2074" name="Picture 26" descr="Maracas | Club Penguin Wiki | Fandom">
+            <a:extLst>
+              <a:ext uri="{FF2B5EF4-FFF2-40B4-BE49-F238E27FC236}">
+                <a16:creationId xmlns:a16="http://schemas.microsoft.com/office/drawing/2014/main" id="{2B556D2F-3F83-4837-A45F-E2E28860A7A3}"/>
+              </a:ext>
+            </a:extLst>
+          </p:cNvPr>
+          <p:cNvPicPr>
+            <a:picLocks noChangeAspect="1" noChangeArrowheads="1"/>
+          </p:cNvPicPr>
+          <p:nvPr/>
+        </p:nvPicPr>
+        <p:blipFill>
+          <a:blip r:embed="rId5">
+            <a:extLst>
+              <a:ext uri="{28A0092B-C50C-407E-A947-70E740481C1C}">
+                <a14:useLocalDpi xmlns:a14="http://schemas.microsoft.com/office/drawing/2010/main" val="0"/>
+              </a:ext>
+            </a:extLst>
+          </a:blip>
+          <a:srcRect/>
+          <a:stretch>
+            <a:fillRect/>
+          </a:stretch>
+        </p:blipFill>
+        <p:spPr bwMode="auto">
+          <a:xfrm>
+            <a:off x="687506" y="3923244"/>
+            <a:ext cx="1300957" cy="1543993"/>
+          </a:xfrm>
+          <a:prstGeom prst="rect">
+            <a:avLst/>
+          </a:prstGeom>
+          <a:noFill/>
+          <a:extLst>
+            <a:ext uri="{909E8E84-426E-40DD-AFC4-6F175D3DCCD1}">
+              <a14:hiddenFill xmlns:a14="http://schemas.microsoft.com/office/drawing/2010/main">
+                <a:solidFill>
+                  <a:srgbClr val="FFFFFF"/>
+                </a:solidFill>
+              </a14:hiddenFill>
+            </a:ext>
+          </a:extLst>
+        </p:spPr>
+      </p:pic>
+      <p:sp>
+        <p:nvSpPr>
+          <p:cNvPr id="15" name="CuadroTexto 14">
+            <a:extLst>
+              <a:ext uri="{FF2B5EF4-FFF2-40B4-BE49-F238E27FC236}">
+                <a16:creationId xmlns:a16="http://schemas.microsoft.com/office/drawing/2014/main" id="{E15E0F4A-009A-4760-A4D3-849FB7293672}"/>
+              </a:ext>
+            </a:extLst>
+          </p:cNvPr>
+          <p:cNvSpPr txBox="1"/>
+          <p:nvPr/>
+        </p:nvSpPr>
+        <p:spPr>
+          <a:xfrm>
+            <a:off x="3535624" y="2782669"/>
+            <a:ext cx="2674039" cy="646331"/>
+          </a:xfrm>
+          <a:prstGeom prst="rect">
+            <a:avLst/>
+          </a:prstGeom>
+          <a:noFill/>
+        </p:spPr>
+        <p:txBody>
+          <a:bodyPr wrap="square" rtlCol="0">
+            <a:spAutoFit/>
+          </a:bodyPr>
+          <a:lstStyle/>
+          <a:p>
+            <a:pPr algn="ctr"/>
+            <a:r>
+              <a:rPr lang="es-MX" dirty="0"/>
+              <a:t>¿ es de madera?</a:t>
+            </a:r>
+          </a:p>
+          <a:p>
+            <a:pPr algn="ctr"/>
+            <a:r>
+              <a:rPr lang="es-MX" dirty="0"/>
+              <a:t>si</a:t>
+            </a:r>
+            <a:endParaRPr lang="es-PE" dirty="0"/>
+          </a:p>
+        </p:txBody>
+      </p:sp>
+    </p:spTree>
+    <p:extLst>
+      <p:ext uri="{BB962C8B-B14F-4D97-AF65-F5344CB8AC3E}">
+        <p14:creationId xmlns:p14="http://schemas.microsoft.com/office/powerpoint/2010/main" val="2903359874"/>
+      </p:ext>
+    </p:extLst>
+  </p:cSld>
+  <p:clrMapOvr>
+    <a:masterClrMapping/>
+  </p:clrMapOvr>
+</p:sld>
+</file>
+
+<file path=ppt/slides/slide6.xml><?xml version="1.0" encoding="utf-8"?>
+<p:sld xmlns:a="http://schemas.openxmlformats.org/drawingml/2006/main" xmlns:r="http://schemas.openxmlformats.org/officeDocument/2006/relationships" xmlns:p="http://schemas.openxmlformats.org/presentationml/2006/main">
+  <p:cSld>
+    <p:spTree>
+      <p:nvGrpSpPr>
+        <p:cNvPr id="1" name=""/>
+        <p:cNvGrpSpPr/>
+        <p:nvPr/>
+      </p:nvGrpSpPr>
+      <p:grpSpPr>
+        <a:xfrm>
+          <a:off x="0" y="0"/>
+          <a:ext cx="0" cy="0"/>
+          <a:chOff x="0" y="0"/>
+          <a:chExt cx="0" cy="0"/>
+        </a:xfrm>
+      </p:grpSpPr>
+      <p:pic>
+        <p:nvPicPr>
+          <p:cNvPr id="2058" name="Picture 10" descr="mariachi instrumento musical violin 1206385 PNG">
+            <a:extLst>
+              <a:ext uri="{FF2B5EF4-FFF2-40B4-BE49-F238E27FC236}">
+                <a16:creationId xmlns:a16="http://schemas.microsoft.com/office/drawing/2014/main" id="{EB1E333C-6B1B-490E-81CB-1E825FC86D8C}"/>
+              </a:ext>
+            </a:extLst>
+          </p:cNvPr>
+          <p:cNvPicPr>
+            <a:picLocks noChangeAspect="1" noChangeArrowheads="1"/>
+          </p:cNvPicPr>
+          <p:nvPr/>
+        </p:nvPicPr>
+        <p:blipFill>
+          <a:blip r:embed="rId2">
+            <a:extLst>
+              <a:ext uri="{28A0092B-C50C-407E-A947-70E740481C1C}">
+                <a14:useLocalDpi xmlns:a14="http://schemas.microsoft.com/office/drawing/2010/main" val="0"/>
+              </a:ext>
+            </a:extLst>
+          </a:blip>
+          <a:srcRect/>
+          <a:stretch>
+            <a:fillRect/>
+          </a:stretch>
+        </p:blipFill>
+        <p:spPr bwMode="auto">
+          <a:xfrm rot="1131174">
+            <a:off x="1831217" y="3609134"/>
+            <a:ext cx="972562" cy="1564792"/>
+          </a:xfrm>
+          <a:prstGeom prst="rect">
+            <a:avLst/>
+          </a:prstGeom>
+          <a:noFill/>
+          <a:extLst>
+            <a:ext uri="{909E8E84-426E-40DD-AFC4-6F175D3DCCD1}">
+              <a14:hiddenFill xmlns:a14="http://schemas.microsoft.com/office/drawing/2010/main">
+                <a:solidFill>
+                  <a:srgbClr val="FFFFFF"/>
+                </a:solidFill>
+              </a14:hiddenFill>
+            </a:ext>
+          </a:extLst>
+        </p:spPr>
+      </p:pic>
+      <p:pic>
+        <p:nvPicPr>
+          <p:cNvPr id="2072" name="Picture 24">
+            <a:extLst>
+              <a:ext uri="{FF2B5EF4-FFF2-40B4-BE49-F238E27FC236}">
+                <a16:creationId xmlns:a16="http://schemas.microsoft.com/office/drawing/2014/main" id="{11C1434C-C96B-4ED9-BD96-BE2B57D9C6F7}"/>
+              </a:ext>
+            </a:extLst>
+          </p:cNvPr>
+          <p:cNvPicPr>
+            <a:picLocks noChangeAspect="1" noChangeArrowheads="1"/>
+          </p:cNvPicPr>
+          <p:nvPr/>
+        </p:nvPicPr>
+        <p:blipFill>
+          <a:blip r:embed="rId3">
+            <a:extLst>
+              <a:ext uri="{28A0092B-C50C-407E-A947-70E740481C1C}">
+                <a14:useLocalDpi xmlns:a14="http://schemas.microsoft.com/office/drawing/2010/main" val="0"/>
+              </a:ext>
+            </a:extLst>
+          </a:blip>
+          <a:srcRect/>
+          <a:stretch>
+            <a:fillRect/>
+          </a:stretch>
+        </p:blipFill>
+        <p:spPr bwMode="auto">
+          <a:xfrm>
+            <a:off x="6991024" y="3349456"/>
+            <a:ext cx="1416925" cy="1464732"/>
+          </a:xfrm>
+          <a:prstGeom prst="rect">
+            <a:avLst/>
+          </a:prstGeom>
+          <a:noFill/>
+          <a:extLst>
+            <a:ext uri="{909E8E84-426E-40DD-AFC4-6F175D3DCCD1}">
+              <a14:hiddenFill xmlns:a14="http://schemas.microsoft.com/office/drawing/2010/main">
+                <a:solidFill>
+                  <a:srgbClr val="FFFFFF"/>
+                </a:solidFill>
+              </a14:hiddenFill>
+            </a:ext>
+          </a:extLst>
+        </p:spPr>
+      </p:pic>
+      <p:pic>
+        <p:nvPicPr>
+          <p:cNvPr id="2074" name="Picture 26" descr="Maracas | Club Penguin Wiki | Fandom">
+            <a:extLst>
+              <a:ext uri="{FF2B5EF4-FFF2-40B4-BE49-F238E27FC236}">
+                <a16:creationId xmlns:a16="http://schemas.microsoft.com/office/drawing/2014/main" id="{2B556D2F-3F83-4837-A45F-E2E28860A7A3}"/>
+              </a:ext>
+            </a:extLst>
+          </p:cNvPr>
+          <p:cNvPicPr>
+            <a:picLocks noChangeAspect="1" noChangeArrowheads="1"/>
+          </p:cNvPicPr>
+          <p:nvPr/>
+        </p:nvPicPr>
+        <p:blipFill>
+          <a:blip r:embed="rId4">
+            <a:extLst>
+              <a:ext uri="{28A0092B-C50C-407E-A947-70E740481C1C}">
+                <a14:useLocalDpi xmlns:a14="http://schemas.microsoft.com/office/drawing/2010/main" val="0"/>
+              </a:ext>
+            </a:extLst>
+          </a:blip>
+          <a:srcRect/>
+          <a:stretch>
+            <a:fillRect/>
+          </a:stretch>
+        </p:blipFill>
+        <p:spPr bwMode="auto">
+          <a:xfrm>
+            <a:off x="4360290" y="3619533"/>
+            <a:ext cx="1300957" cy="1543993"/>
+          </a:xfrm>
+          <a:prstGeom prst="rect">
+            <a:avLst/>
+          </a:prstGeom>
+          <a:noFill/>
+          <a:extLst>
+            <a:ext uri="{909E8E84-426E-40DD-AFC4-6F175D3DCCD1}">
+              <a14:hiddenFill xmlns:a14="http://schemas.microsoft.com/office/drawing/2010/main">
+                <a:solidFill>
+                  <a:srgbClr val="FFFFFF"/>
+                </a:solidFill>
+              </a14:hiddenFill>
+            </a:ext>
+          </a:extLst>
+        </p:spPr>
+      </p:pic>
+      <p:sp>
+        <p:nvSpPr>
+          <p:cNvPr id="15" name="CuadroTexto 14">
+            <a:extLst>
+              <a:ext uri="{FF2B5EF4-FFF2-40B4-BE49-F238E27FC236}">
+                <a16:creationId xmlns:a16="http://schemas.microsoft.com/office/drawing/2014/main" id="{2201ABF4-5C25-4D52-9457-8FA5624B744C}"/>
+              </a:ext>
+            </a:extLst>
+          </p:cNvPr>
+          <p:cNvSpPr txBox="1"/>
+          <p:nvPr/>
+        </p:nvSpPr>
+        <p:spPr>
+          <a:xfrm>
+            <a:off x="3493290" y="2538230"/>
+            <a:ext cx="2674039" cy="646331"/>
+          </a:xfrm>
+          <a:prstGeom prst="rect">
+            <a:avLst/>
+          </a:prstGeom>
+          <a:noFill/>
+        </p:spPr>
+        <p:txBody>
+          <a:bodyPr wrap="square" rtlCol="0">
+            <a:spAutoFit/>
+          </a:bodyPr>
+          <a:lstStyle/>
+          <a:p>
+            <a:pPr algn="ctr"/>
+            <a:r>
+              <a:rPr lang="es-MX" dirty="0"/>
+              <a:t>¿ es liviano?</a:t>
+            </a:r>
+          </a:p>
+          <a:p>
+            <a:pPr algn="ctr"/>
+            <a:r>
+              <a:rPr lang="es-MX" dirty="0"/>
+              <a:t>si</a:t>
+            </a:r>
+            <a:endParaRPr lang="es-PE" dirty="0"/>
+          </a:p>
+        </p:txBody>
+      </p:sp>
+    </p:spTree>
+    <p:extLst>
+      <p:ext uri="{BB962C8B-B14F-4D97-AF65-F5344CB8AC3E}">
+        <p14:creationId xmlns:p14="http://schemas.microsoft.com/office/powerpoint/2010/main" val="3837207041"/>
+      </p:ext>
+    </p:extLst>
+  </p:cSld>
+  <p:clrMapOvr>
+    <a:masterClrMapping/>
+  </p:clrMapOvr>
+</p:sld>
+</file>
+
+<file path=ppt/slides/slide7.xml><?xml version="1.0" encoding="utf-8"?>
+<p:sld xmlns:a="http://schemas.openxmlformats.org/drawingml/2006/main" xmlns:r="http://schemas.openxmlformats.org/officeDocument/2006/relationships" xmlns:p="http://schemas.openxmlformats.org/presentationml/2006/main">
+  <p:cSld>
+    <p:spTree>
+      <p:nvGrpSpPr>
+        <p:cNvPr id="1" name=""/>
+        <p:cNvGrpSpPr/>
+        <p:nvPr/>
+      </p:nvGrpSpPr>
+      <p:grpSpPr>
+        <a:xfrm>
+          <a:off x="0" y="0"/>
+          <a:ext cx="0" cy="0"/>
+          <a:chOff x="0" y="0"/>
+          <a:chExt cx="0" cy="0"/>
+        </a:xfrm>
+      </p:grpSpPr>
+      <p:pic>
+        <p:nvPicPr>
+          <p:cNvPr id="2058" name="Picture 10" descr="mariachi instrumento musical violin 1206385 PNG">
+            <a:extLst>
+              <a:ext uri="{FF2B5EF4-FFF2-40B4-BE49-F238E27FC236}">
+                <a16:creationId xmlns:a16="http://schemas.microsoft.com/office/drawing/2014/main" id="{EB1E333C-6B1B-490E-81CB-1E825FC86D8C}"/>
+              </a:ext>
+            </a:extLst>
+          </p:cNvPr>
+          <p:cNvPicPr>
+            <a:picLocks noChangeAspect="1" noChangeArrowheads="1"/>
+          </p:cNvPicPr>
+          <p:nvPr/>
+        </p:nvPicPr>
+        <p:blipFill>
+          <a:blip r:embed="rId2">
+            <a:extLst>
+              <a:ext uri="{28A0092B-C50C-407E-A947-70E740481C1C}">
+                <a14:useLocalDpi xmlns:a14="http://schemas.microsoft.com/office/drawing/2010/main" val="0"/>
+              </a:ext>
+            </a:extLst>
+          </a:blip>
+          <a:srcRect/>
+          <a:stretch>
+            <a:fillRect/>
+          </a:stretch>
+        </p:blipFill>
+        <p:spPr bwMode="auto">
+          <a:xfrm rot="1131174">
+            <a:off x="2663916" y="3795400"/>
+            <a:ext cx="972562" cy="1564792"/>
+          </a:xfrm>
+          <a:prstGeom prst="rect">
+            <a:avLst/>
+          </a:prstGeom>
+          <a:noFill/>
+          <a:extLst>
+            <a:ext uri="{909E8E84-426E-40DD-AFC4-6F175D3DCCD1}">
+              <a14:hiddenFill xmlns:a14="http://schemas.microsoft.com/office/drawing/2010/main">
+                <a:solidFill>
+                  <a:srgbClr val="FFFFFF"/>
+                </a:solidFill>
+              </a14:hiddenFill>
+            </a:ext>
+          </a:extLst>
+        </p:spPr>
+      </p:pic>
+      <p:pic>
+        <p:nvPicPr>
+          <p:cNvPr id="2074" name="Picture 26" descr="Maracas | Club Penguin Wiki | Fandom">
+            <a:extLst>
+              <a:ext uri="{FF2B5EF4-FFF2-40B4-BE49-F238E27FC236}">
+                <a16:creationId xmlns:a16="http://schemas.microsoft.com/office/drawing/2014/main" id="{2B556D2F-3F83-4837-A45F-E2E28860A7A3}"/>
+              </a:ext>
+            </a:extLst>
+          </p:cNvPr>
+          <p:cNvPicPr>
+            <a:picLocks noChangeAspect="1" noChangeArrowheads="1"/>
+          </p:cNvPicPr>
+          <p:nvPr/>
+        </p:nvPicPr>
+        <p:blipFill>
+          <a:blip r:embed="rId3">
+            <a:extLst>
+              <a:ext uri="{28A0092B-C50C-407E-A947-70E740481C1C}">
+                <a14:useLocalDpi xmlns:a14="http://schemas.microsoft.com/office/drawing/2010/main" val="0"/>
+              </a:ext>
+            </a:extLst>
+          </a:blip>
+          <a:srcRect/>
+          <a:stretch>
+            <a:fillRect/>
+          </a:stretch>
+        </p:blipFill>
+        <p:spPr bwMode="auto">
+          <a:xfrm>
+            <a:off x="6042789" y="3984340"/>
+            <a:ext cx="1300957" cy="1543993"/>
+          </a:xfrm>
+          <a:prstGeom prst="rect">
+            <a:avLst/>
+          </a:prstGeom>
+          <a:noFill/>
+          <a:extLst>
+            <a:ext uri="{909E8E84-426E-40DD-AFC4-6F175D3DCCD1}">
+              <a14:hiddenFill xmlns:a14="http://schemas.microsoft.com/office/drawing/2010/main">
+                <a:solidFill>
+                  <a:srgbClr val="FFFFFF"/>
+                </a:solidFill>
+              </a14:hiddenFill>
+            </a:ext>
+          </a:extLst>
+        </p:spPr>
+      </p:pic>
+      <p:sp>
+        <p:nvSpPr>
+          <p:cNvPr id="15" name="CuadroTexto 14">
+            <a:extLst>
+              <a:ext uri="{FF2B5EF4-FFF2-40B4-BE49-F238E27FC236}">
+                <a16:creationId xmlns:a16="http://schemas.microsoft.com/office/drawing/2014/main" id="{9BF236B2-4BF6-4CD8-85FB-2C39AAE5C68C}"/>
+              </a:ext>
+            </a:extLst>
+          </p:cNvPr>
+          <p:cNvSpPr txBox="1"/>
+          <p:nvPr/>
+        </p:nvSpPr>
+        <p:spPr>
+          <a:xfrm>
+            <a:off x="3486037" y="2873660"/>
+            <a:ext cx="2674039" cy="646331"/>
+          </a:xfrm>
+          <a:prstGeom prst="rect">
+            <a:avLst/>
+          </a:prstGeom>
+          <a:noFill/>
+        </p:spPr>
+        <p:txBody>
+          <a:bodyPr wrap="square" rtlCol="0">
+            <a:spAutoFit/>
+          </a:bodyPr>
+          <a:lstStyle/>
+          <a:p>
+            <a:pPr algn="ctr"/>
+            <a:r>
+              <a:rPr lang="es-MX" dirty="0"/>
+              <a:t>¿ tiene cuerda?</a:t>
+            </a:r>
+          </a:p>
+          <a:p>
+            <a:pPr algn="ctr"/>
+            <a:r>
+              <a:rPr lang="es-MX" dirty="0"/>
+              <a:t>si</a:t>
+            </a:r>
+            <a:endParaRPr lang="es-PE" dirty="0"/>
+          </a:p>
+        </p:txBody>
+      </p:sp>
+    </p:spTree>
+    <p:extLst>
+      <p:ext uri="{BB962C8B-B14F-4D97-AF65-F5344CB8AC3E}">
+        <p14:creationId xmlns:p14="http://schemas.microsoft.com/office/powerpoint/2010/main" val="2619839619"/>
+      </p:ext>
+    </p:extLst>
+  </p:cSld>
+  <p:clrMapOvr>
+    <a:masterClrMapping/>
+  </p:clrMapOvr>
+</p:sld>
+</file>
+
+<file path=ppt/slides/slide8.xml><?xml version="1.0" encoding="utf-8"?>
+<p:sld xmlns:a="http://schemas.openxmlformats.org/drawingml/2006/main" xmlns:r="http://schemas.openxmlformats.org/officeDocument/2006/relationships" xmlns:p="http://schemas.openxmlformats.org/presentationml/2006/main">
+  <p:cSld>
+    <p:spTree>
+      <p:nvGrpSpPr>
+        <p:cNvPr id="1" name=""/>
+        <p:cNvGrpSpPr/>
+        <p:nvPr/>
+      </p:nvGrpSpPr>
+      <p:grpSpPr>
+        <a:xfrm>
+          <a:off x="0" y="0"/>
+          <a:ext cx="0" cy="0"/>
+          <a:chOff x="0" y="0"/>
+          <a:chExt cx="0" cy="0"/>
+        </a:xfrm>
+      </p:grpSpPr>
+      <p:pic>
+        <p:nvPicPr>
+          <p:cNvPr id="2058" name="Picture 10" descr="mariachi instrumento musical violin 1206385 PNG">
+            <a:extLst>
+              <a:ext uri="{FF2B5EF4-FFF2-40B4-BE49-F238E27FC236}">
+                <a16:creationId xmlns:a16="http://schemas.microsoft.com/office/drawing/2014/main" id="{EB1E333C-6B1B-490E-81CB-1E825FC86D8C}"/>
+              </a:ext>
+            </a:extLst>
+          </p:cNvPr>
+          <p:cNvPicPr>
+            <a:picLocks noChangeAspect="1" noChangeArrowheads="1"/>
+          </p:cNvPicPr>
+          <p:nvPr/>
+        </p:nvPicPr>
+        <p:blipFill>
+          <a:blip r:embed="rId2">
+            <a:extLst>
+              <a:ext uri="{28A0092B-C50C-407E-A947-70E740481C1C}">
+                <a14:useLocalDpi xmlns:a14="http://schemas.microsoft.com/office/drawing/2010/main" val="0"/>
+              </a:ext>
+            </a:extLst>
+          </a:blip>
+          <a:srcRect/>
+          <a:stretch>
+            <a:fillRect/>
+          </a:stretch>
+        </p:blipFill>
+        <p:spPr bwMode="auto">
+          <a:xfrm rot="1131174">
+            <a:off x="3315432" y="1236670"/>
+            <a:ext cx="2294140" cy="3691129"/>
+          </a:xfrm>
+          <a:prstGeom prst="rect">
+            <a:avLst/>
+          </a:prstGeom>
+          <a:noFill/>
+          <a:extLst>
+            <a:ext uri="{909E8E84-426E-40DD-AFC4-6F175D3DCCD1}">
+              <a14:hiddenFill xmlns:a14="http://schemas.microsoft.com/office/drawing/2010/main">
+                <a:solidFill>
+                  <a:srgbClr val="FFFFFF"/>
+                </a:solidFill>
+              </a14:hiddenFill>
+            </a:ext>
+          </a:extLst>
+        </p:spPr>
+      </p:pic>
+    </p:spTree>
+    <p:extLst>
+      <p:ext uri="{BB962C8B-B14F-4D97-AF65-F5344CB8AC3E}">
+        <p14:creationId xmlns:p14="http://schemas.microsoft.com/office/powerpoint/2010/main" val="442628962"/>
+      </p:ext>
+    </p:extLst>
+  </p:cSld>
+  <p:clrMapOvr>
+    <a:masterClrMapping/>
+  </p:clrMapOvr>
+</p:sld>
+</file>
+
+<file path=ppt/slides/slide9.xml><?xml version="1.0" encoding="utf-8"?>
 <p:sld xmlns:a="http://schemas.openxmlformats.org/drawingml/2006/main" xmlns:r="http://schemas.openxmlformats.org/officeDocument/2006/relationships" xmlns:p="http://schemas.openxmlformats.org/presentationml/2006/main">
   <p:cSld>
     <p:spTree>

</xml_diff>